<commit_message>
updates to stepwise regression and poster
</commit_message>
<xml_diff>
--- a/TM12_15.071_Term_Project_Poster.pptx
+++ b/TM12_15.071_Term_Project_Poster.pptx
@@ -212,7 +212,7 @@
           <a:p>
             <a:fld id="{890071B7-4BD8-8145-82BE-2A6C42B82778}" type="datetime1">
               <a:rPr lang="en-US" smtClean="0"/>
-              <a:t>11/23/19</a:t>
+              <a:t>11/26/19</a:t>
             </a:fld>
             <a:endParaRPr lang="en-US"/>
           </a:p>
@@ -381,7 +381,7 @@
           <a:p>
             <a:fld id="{7391307E-C702-714D-87CE-7789B0B8B84B}" type="datetime1">
               <a:rPr lang="en-US" smtClean="0"/>
-              <a:t>11/23/19</a:t>
+              <a:t>11/26/19</a:t>
             </a:fld>
             <a:endParaRPr lang="en-US"/>
           </a:p>
@@ -4253,186 +4253,85 @@
           </a:p>
         </p:txBody>
       </p:sp>
-      <p:pic>
-        <p:nvPicPr>
-          <p:cNvPr id="7" name="Picture 6" descr="A screenshot of a cell phone&#10;&#10;Description automatically generated">
+      <p:sp>
+        <p:nvSpPr>
+          <p:cNvPr id="25" name="TextBox 24">
             <a:extLst>
               <a:ext uri="{FF2B5EF4-FFF2-40B4-BE49-F238E27FC236}">
-                <a16:creationId xmlns:a16="http://schemas.microsoft.com/office/drawing/2014/main" id="{35E0DAB3-BA4D-4E2A-BAF2-449E24573789}"/>
+                <a16:creationId xmlns:a16="http://schemas.microsoft.com/office/drawing/2014/main" id="{70E02502-993E-2A4A-8BF1-43604979461D}"/>
               </a:ext>
             </a:extLst>
           </p:cNvPr>
-          <p:cNvPicPr>
-            <a:picLocks noChangeAspect="1"/>
-          </p:cNvPicPr>
+          <p:cNvSpPr txBox="1"/>
           <p:nvPr/>
-        </p:nvPicPr>
-        <p:blipFill>
-          <a:blip r:embed="rId4">
-            <a:extLst>
-              <a:ext uri="{28A0092B-C50C-407E-A947-70E740481C1C}">
-                <a14:useLocalDpi xmlns:a14="http://schemas.microsoft.com/office/drawing/2010/main" val="0"/>
-              </a:ext>
-            </a:extLst>
-          </a:blip>
-          <a:stretch>
-            <a:fillRect/>
-          </a:stretch>
-        </p:blipFill>
-        <p:spPr>
-          <a:xfrm>
-            <a:off x="5386610" y="11658509"/>
-            <a:ext cx="16023286" cy="6744641"/>
+        </p:nvSpPr>
+        <p:spPr>
+          <a:xfrm>
+            <a:off x="153566" y="8212613"/>
+            <a:ext cx="5789335" cy="2585323"/>
           </a:xfrm>
           <a:prstGeom prst="rect">
             <a:avLst/>
           </a:prstGeom>
-        </p:spPr>
-      </p:pic>
-      <p:pic>
-        <p:nvPicPr>
-          <p:cNvPr id="10" name="Picture 9" descr="A screenshot of a cell phone&#10;&#10;Description automatically generated">
-            <a:extLst>
-              <a:ext uri="{FF2B5EF4-FFF2-40B4-BE49-F238E27FC236}">
-                <a16:creationId xmlns:a16="http://schemas.microsoft.com/office/drawing/2014/main" id="{EC8A8D4B-65E4-478E-AE6F-A4FE0C9B8988}"/>
-              </a:ext>
-            </a:extLst>
-          </p:cNvPr>
-          <p:cNvPicPr>
-            <a:picLocks noChangeAspect="1"/>
-          </p:cNvPicPr>
-          <p:nvPr/>
-        </p:nvPicPr>
-        <p:blipFill>
-          <a:blip r:embed="rId5">
-            <a:extLst>
-              <a:ext uri="{28A0092B-C50C-407E-A947-70E740481C1C}">
-                <a14:useLocalDpi xmlns:a14="http://schemas.microsoft.com/office/drawing/2010/main" val="0"/>
-              </a:ext>
-            </a:extLst>
-          </a:blip>
-          <a:stretch>
-            <a:fillRect/>
-          </a:stretch>
-        </p:blipFill>
-        <p:spPr>
-          <a:xfrm>
-            <a:off x="17416430" y="3194412"/>
-            <a:ext cx="14994443" cy="6744641"/>
-          </a:xfrm>
-          <a:prstGeom prst="rect">
-            <a:avLst/>
-          </a:prstGeom>
-        </p:spPr>
-      </p:pic>
-      <p:pic>
-        <p:nvPicPr>
-          <p:cNvPr id="14" name="Picture 13" descr="A screenshot of a cell phone&#10;&#10;Description automatically generated">
-            <a:extLst>
-              <a:ext uri="{FF2B5EF4-FFF2-40B4-BE49-F238E27FC236}">
-                <a16:creationId xmlns:a16="http://schemas.microsoft.com/office/drawing/2014/main" id="{C379AF7E-34C5-47FA-897D-696F13C8FC07}"/>
-              </a:ext>
-            </a:extLst>
-          </p:cNvPr>
-          <p:cNvPicPr>
-            <a:picLocks noChangeAspect="1"/>
-          </p:cNvPicPr>
-          <p:nvPr/>
-        </p:nvPicPr>
-        <p:blipFill>
-          <a:blip r:embed="rId6">
-            <a:extLst>
-              <a:ext uri="{28A0092B-C50C-407E-A947-70E740481C1C}">
-                <a14:useLocalDpi xmlns:a14="http://schemas.microsoft.com/office/drawing/2010/main" val="0"/>
-              </a:ext>
-            </a:extLst>
-          </a:blip>
-          <a:stretch>
-            <a:fillRect/>
-          </a:stretch>
-        </p:blipFill>
-        <p:spPr>
-          <a:xfrm>
-            <a:off x="-1526657" y="2945199"/>
-            <a:ext cx="14994443" cy="6744641"/>
-          </a:xfrm>
-          <a:prstGeom prst="rect">
-            <a:avLst/>
-          </a:prstGeom>
-        </p:spPr>
-      </p:pic>
-      <p:pic>
-        <p:nvPicPr>
-          <p:cNvPr id="16" name="Picture 15" descr="A close up of a map&#10;&#10;Description automatically generated">
-            <a:extLst>
-              <a:ext uri="{FF2B5EF4-FFF2-40B4-BE49-F238E27FC236}">
-                <a16:creationId xmlns:a16="http://schemas.microsoft.com/office/drawing/2014/main" id="{7F238D30-94FA-4196-B078-F36C61BA9FFC}"/>
-              </a:ext>
-            </a:extLst>
-          </p:cNvPr>
-          <p:cNvPicPr>
-            <a:picLocks noChangeAspect="1"/>
-          </p:cNvPicPr>
-          <p:nvPr/>
-        </p:nvPicPr>
-        <p:blipFill>
-          <a:blip r:embed="rId7">
-            <a:extLst>
-              <a:ext uri="{28A0092B-C50C-407E-A947-70E740481C1C}">
-                <a14:useLocalDpi xmlns:a14="http://schemas.microsoft.com/office/drawing/2010/main" val="0"/>
-              </a:ext>
-            </a:extLst>
-          </a:blip>
-          <a:stretch>
-            <a:fillRect/>
-          </a:stretch>
-        </p:blipFill>
-        <p:spPr>
-          <a:xfrm>
-            <a:off x="-5068050" y="4358943"/>
-            <a:ext cx="24052743" cy="10260911"/>
-          </a:xfrm>
-          <a:prstGeom prst="rect">
-            <a:avLst/>
-          </a:prstGeom>
-        </p:spPr>
-      </p:pic>
-      <p:pic>
-        <p:nvPicPr>
-          <p:cNvPr id="20" name="Picture 19" descr="A screenshot of a cell phone&#10;&#10;Description automatically generated">
-            <a:extLst>
-              <a:ext uri="{FF2B5EF4-FFF2-40B4-BE49-F238E27FC236}">
-                <a16:creationId xmlns:a16="http://schemas.microsoft.com/office/drawing/2014/main" id="{4DFFC69D-CFF8-4ABA-B851-2B1692EB086C}"/>
-              </a:ext>
-            </a:extLst>
-          </p:cNvPr>
-          <p:cNvPicPr>
-            <a:picLocks noChangeAspect="1"/>
-          </p:cNvPicPr>
-          <p:nvPr/>
-        </p:nvPicPr>
-        <p:blipFill>
-          <a:blip r:embed="rId8">
-            <a:extLst>
-              <a:ext uri="{28A0092B-C50C-407E-A947-70E740481C1C}">
-                <a14:useLocalDpi xmlns:a14="http://schemas.microsoft.com/office/drawing/2010/main" val="0"/>
-              </a:ext>
-            </a:extLst>
-          </a:blip>
-          <a:stretch>
-            <a:fillRect/>
-          </a:stretch>
-        </p:blipFill>
-        <p:spPr>
-          <a:xfrm>
-            <a:off x="12496800" y="5080911"/>
-            <a:ext cx="16709182" cy="6744641"/>
-          </a:xfrm>
-          <a:prstGeom prst="rect">
-            <a:avLst/>
-          </a:prstGeom>
-        </p:spPr>
-      </p:pic>
+          <a:noFill/>
+        </p:spPr>
+        <p:txBody>
+          <a:bodyPr wrap="square" rtlCol="0">
+            <a:spAutoFit/>
+          </a:bodyPr>
+          <a:lstStyle/>
+          <a:p>
+            <a:pPr marL="285750" indent="-285750">
+              <a:buFont typeface="Arial" panose="020B0604020202020204" pitchFamily="34" charset="0"/>
+              <a:buChar char="•"/>
+            </a:pPr>
+            <a:r>
+              <a:rPr lang="en-US" sz="1800" dirty="0"/>
+              <a:t>How should we structure the data to achieve the best results?</a:t>
+            </a:r>
+          </a:p>
+          <a:p>
+            <a:pPr marL="285750" indent="-285750">
+              <a:buFont typeface="Arial" panose="020B0604020202020204" pitchFamily="34" charset="0"/>
+              <a:buChar char="•"/>
+            </a:pPr>
+            <a:r>
+              <a:rPr lang="en-US" sz="1800" dirty="0"/>
+              <a:t>What are the most significant independent variables affecting flight delay?</a:t>
+            </a:r>
+          </a:p>
+          <a:p>
+            <a:pPr marL="285750" indent="-285750">
+              <a:buFont typeface="Arial" panose="020B0604020202020204" pitchFamily="34" charset="0"/>
+              <a:buChar char="•"/>
+            </a:pPr>
+            <a:r>
+              <a:rPr lang="en-US" sz="1800" dirty="0"/>
+              <a:t>How will the decisions travels make when selecting a flight impact the expected duration of delay?</a:t>
+            </a:r>
+          </a:p>
+          <a:p>
+            <a:pPr marL="285750" indent="-285750">
+              <a:buFont typeface="Arial" panose="020B0604020202020204" pitchFamily="34" charset="0"/>
+              <a:buChar char="•"/>
+            </a:pPr>
+            <a:r>
+              <a:rPr lang="en-US" sz="1800" dirty="0"/>
+              <a:t>What model family will provide the best prediction of future flight delays?</a:t>
+            </a:r>
+          </a:p>
+          <a:p>
+            <a:pPr marL="285750" indent="-285750">
+              <a:buFont typeface="Arial" panose="020B0604020202020204" pitchFamily="34" charset="0"/>
+              <a:buChar char="•"/>
+            </a:pPr>
+            <a:r>
+              <a:rPr lang="en-US" sz="1800" dirty="0"/>
+              <a:t>What model parameters will provide the best performance?</a:t>
+            </a:r>
+          </a:p>
+        </p:txBody>
+      </p:sp>
     </p:spTree>
     <p:extLst>
       <p:ext uri="{BB962C8B-B14F-4D97-AF65-F5344CB8AC3E}">
@@ -4934,7 +4833,7 @@
         </p:nvSpPr>
         <p:spPr>
           <a:xfrm>
-            <a:off x="76201" y="3276600"/>
+            <a:off x="76201" y="3025693"/>
             <a:ext cx="5902142" cy="555707"/>
           </a:xfrm>
           <a:prstGeom prst="rect">
@@ -4991,7 +4890,7 @@
         </p:nvSpPr>
         <p:spPr>
           <a:xfrm>
-            <a:off x="76200" y="5616493"/>
+            <a:off x="76200" y="5410200"/>
             <a:ext cx="5938837" cy="555707"/>
           </a:xfrm>
           <a:prstGeom prst="rect">
@@ -5029,7 +4928,7 @@
               <a:rPr lang="en-US" sz="2600" b="1" dirty="0">
                 <a:latin typeface="+mj-lt"/>
               </a:rPr>
-              <a:t>Key questions</a:t>
+              <a:t>Data</a:t>
             </a:r>
           </a:p>
         </p:txBody>
@@ -5087,63 +4986,6 @@
                 <a:latin typeface="+mj-lt"/>
               </a:rPr>
               <a:t>Data Visualization</a:t>
-            </a:r>
-          </a:p>
-        </p:txBody>
-      </p:sp>
-      <p:sp>
-        <p:nvSpPr>
-          <p:cNvPr id="24" name="Rectangle 23">
-            <a:extLst>
-              <a:ext uri="{FF2B5EF4-FFF2-40B4-BE49-F238E27FC236}">
-                <a16:creationId xmlns:a16="http://schemas.microsoft.com/office/drawing/2014/main" id="{CC08E273-E82D-C049-8A65-5A150105876E}"/>
-              </a:ext>
-            </a:extLst>
-          </p:cNvPr>
-          <p:cNvSpPr/>
-          <p:nvPr/>
-        </p:nvSpPr>
-        <p:spPr>
-          <a:xfrm>
-            <a:off x="5977734" y="6379333"/>
-            <a:ext cx="5595959" cy="555707"/>
-          </a:xfrm>
-          <a:prstGeom prst="rect">
-            <a:avLst/>
-          </a:prstGeom>
-          <a:solidFill>
-            <a:schemeClr val="accent1"/>
-          </a:solidFill>
-          <a:ln w="50800" cap="rnd" cmpd="dbl" algn="ctr">
-            <a:noFill/>
-            <a:prstDash val="solid"/>
-          </a:ln>
-          <a:effectLst/>
-        </p:spPr>
-        <p:style>
-          <a:lnRef idx="3">
-            <a:schemeClr val="lt1"/>
-          </a:lnRef>
-          <a:fillRef idx="1">
-            <a:schemeClr val="accent1"/>
-          </a:fillRef>
-          <a:effectRef idx="1">
-            <a:schemeClr val="accent1"/>
-          </a:effectRef>
-          <a:fontRef idx="minor">
-            <a:schemeClr val="lt1"/>
-          </a:fontRef>
-        </p:style>
-        <p:txBody>
-          <a:bodyPr anchor="ctr"/>
-          <a:lstStyle/>
-          <a:p>
-            <a:pPr algn="ctr" eaLnBrk="1" latinLnBrk="0" hangingPunct="1"/>
-            <a:r>
-              <a:rPr lang="en-US" sz="2600" b="1" dirty="0">
-                <a:latin typeface="+mj-lt"/>
-              </a:rPr>
-              <a:t>Results</a:t>
             </a:r>
           </a:p>
         </p:txBody>
@@ -5683,7 +5525,7 @@
               <a:rPr lang="en-US" sz="2600" b="1" dirty="0">
                 <a:latin typeface="+mj-lt"/>
               </a:rPr>
-              <a:t>Takeaways</a:t>
+              <a:t>Results</a:t>
             </a:r>
           </a:p>
         </p:txBody>
@@ -5702,7 +5544,7 @@
         </p:nvSpPr>
         <p:spPr>
           <a:xfrm>
-            <a:off x="11573084" y="4724400"/>
+            <a:off x="11573084" y="6096000"/>
             <a:ext cx="5660136" cy="555707"/>
           </a:xfrm>
           <a:prstGeom prst="rect">
@@ -5760,7 +5602,7 @@
         <p:spPr>
           <a:xfrm>
             <a:off x="134093" y="1643008"/>
-            <a:ext cx="5816048" cy="1477328"/>
+            <a:ext cx="5816048" cy="1200329"/>
           </a:xfrm>
           <a:prstGeom prst="rect">
             <a:avLst/>
@@ -5775,13 +5617,7 @@
           <a:p>
             <a:r>
               <a:rPr lang="en-US" sz="1800" dirty="0"/>
-              <a:t>Using commercial aviation flight data, we created a model that predicts the delay times for future flights. This provides travelers with decision-relevant information they can use to reduce the duration of their travel delays.</a:t>
-            </a:r>
-          </a:p>
-          <a:p>
-            <a:r>
-              <a:rPr lang="en-US" sz="1800" dirty="0"/>
-              <a:t>Results &amp; Conclusion …</a:t>
+              <a:t>Using commercial aviation data, we created a model that predicts the delay times for future flights. This provides travelers with decision-relevant information they can use to reduce the duration of their travel delays.</a:t>
             </a:r>
           </a:p>
         </p:txBody>
@@ -5800,7 +5636,7 @@
         </p:nvSpPr>
         <p:spPr>
           <a:xfrm>
-            <a:off x="150903" y="3884474"/>
+            <a:off x="150903" y="3581400"/>
             <a:ext cx="5789335" cy="1754326"/>
           </a:xfrm>
           <a:prstGeom prst="rect">
@@ -5816,86 +5652,7 @@
           <a:p>
             <a:r>
               <a:rPr lang="en-US" sz="1800" dirty="0"/>
-              <a:t>A study estimated that in 2007, the total direct cost to US passengers from air transportation delay was $16.7 billon. Despite the cost and inconvenience of delays, travelers have to make many decisions (airports, airline, flight time and date), with little information about how those variables impact the likelihood of delay.</a:t>
-            </a:r>
-          </a:p>
-        </p:txBody>
-      </p:sp>
-      <p:sp>
-        <p:nvSpPr>
-          <p:cNvPr id="30" name="TextBox 29">
-            <a:extLst>
-              <a:ext uri="{FF2B5EF4-FFF2-40B4-BE49-F238E27FC236}">
-                <a16:creationId xmlns:a16="http://schemas.microsoft.com/office/drawing/2014/main" id="{986E3B4B-43D6-F745-B58B-B95E38CDD180}"/>
-              </a:ext>
-            </a:extLst>
-          </p:cNvPr>
-          <p:cNvSpPr txBox="1"/>
-          <p:nvPr/>
-        </p:nvSpPr>
-        <p:spPr>
-          <a:xfrm>
-            <a:off x="132604" y="6172600"/>
-            <a:ext cx="5789335" cy="2585323"/>
-          </a:xfrm>
-          <a:prstGeom prst="rect">
-            <a:avLst/>
-          </a:prstGeom>
-          <a:noFill/>
-        </p:spPr>
-        <p:txBody>
-          <a:bodyPr wrap="square" rtlCol="0">
-            <a:spAutoFit/>
-          </a:bodyPr>
-          <a:lstStyle/>
-          <a:p>
-            <a:pPr marL="285750" indent="-285750">
-              <a:buFont typeface="Arial" panose="020B0604020202020204" pitchFamily="34" charset="0"/>
-              <a:buChar char="•"/>
-            </a:pPr>
-            <a:r>
-              <a:rPr lang="en-US" sz="1800" dirty="0"/>
-              <a:t>How should we structure the data to achieve the best results?</a:t>
-            </a:r>
-          </a:p>
-          <a:p>
-            <a:pPr marL="285750" indent="-285750">
-              <a:buFont typeface="Arial" panose="020B0604020202020204" pitchFamily="34" charset="0"/>
-              <a:buChar char="•"/>
-            </a:pPr>
-            <a:r>
-              <a:rPr lang="en-US" sz="1800" dirty="0"/>
-              <a:t>What are the most significant independent variables affecting flight delay?</a:t>
-            </a:r>
-          </a:p>
-          <a:p>
-            <a:pPr marL="285750" indent="-285750">
-              <a:buFont typeface="Arial" panose="020B0604020202020204" pitchFamily="34" charset="0"/>
-              <a:buChar char="•"/>
-            </a:pPr>
-            <a:r>
-              <a:rPr lang="en-US" sz="1800" dirty="0"/>
-              <a:t>How will the decisions travels make when selecting a flight impact the expected duration of delay?</a:t>
-            </a:r>
-          </a:p>
-          <a:p>
-            <a:pPr marL="285750" indent="-285750">
-              <a:buFont typeface="Arial" panose="020B0604020202020204" pitchFamily="34" charset="0"/>
-              <a:buChar char="•"/>
-            </a:pPr>
-            <a:r>
-              <a:rPr lang="en-US" sz="1800" dirty="0"/>
-              <a:t>What model family will provide the best prediction of future flight delays?</a:t>
-            </a:r>
-          </a:p>
-          <a:p>
-            <a:pPr marL="285750" indent="-285750">
-              <a:buFont typeface="Arial" panose="020B0604020202020204" pitchFamily="34" charset="0"/>
-              <a:buChar char="•"/>
-            </a:pPr>
-            <a:r>
-              <a:rPr lang="en-US" sz="1800" dirty="0"/>
-              <a:t>What model parameters will provide the best performance?</a:t>
+              <a:t>A study estimated that in 2007, the total direct cost to US passengers from air transportation delay was $16.7 billon. Despite the significant cost and inconvenience of delays, travelers have to make many decisions (airports, airline, flight time and date), with little information about how those variables impact the amount of delay they experience.</a:t>
             </a:r>
           </a:p>
         </p:txBody>
@@ -5914,8 +5671,8 @@
         </p:nvSpPr>
         <p:spPr>
           <a:xfrm>
-            <a:off x="132604" y="9419272"/>
-            <a:ext cx="5780345" cy="1477328"/>
+            <a:off x="132604" y="6019800"/>
+            <a:ext cx="5780345" cy="1754326"/>
           </a:xfrm>
           <a:prstGeom prst="rect">
             <a:avLst/>
@@ -5930,7 +5687,7 @@
           <a:p>
             <a:r>
               <a:rPr lang="en-US" sz="1800" dirty="0"/>
-              <a:t>We utilize a dataset from the Bureau of Transportation Statistics containing commercial aviation flight data from 2009 to 2018. After processing the dataset contains 1.8 million entries across 8 variables. The dependent variable is Arrival Delay. Independent variables: </a:t>
+              <a:t>We utilize a dataset from the U.S. Department of Transportation containing commercial aviation flight data from 2009 to 2018. After processing the dataset contains 1.8 million entries across 8 variables. The dependent variable is Arrival Delay. Independent variables are carrier, origin, destination, distance, destination, and date/time of flight.</a:t>
             </a:r>
           </a:p>
         </p:txBody>
@@ -5963,8 +5720,8 @@
         </p:blipFill>
         <p:spPr>
           <a:xfrm>
-            <a:off x="17703883" y="179202"/>
-            <a:ext cx="8663004" cy="3641073"/>
+            <a:off x="6014006" y="4538928"/>
+            <a:ext cx="5520972" cy="2320472"/>
           </a:xfrm>
           <a:prstGeom prst="rect">
             <a:avLst/>
@@ -5985,7 +5742,7 @@
         </p:nvSpPr>
         <p:spPr>
           <a:xfrm>
-            <a:off x="78926" y="8800960"/>
+            <a:off x="78926" y="7772400"/>
             <a:ext cx="5890097" cy="555707"/>
           </a:xfrm>
           <a:prstGeom prst="rect">
@@ -6023,7 +5780,7 @@
               <a:rPr lang="en-US" sz="2600" b="1" dirty="0">
                 <a:latin typeface="+mj-lt"/>
               </a:rPr>
-              <a:t>Data</a:t>
+              <a:t>Analytical Approach</a:t>
             </a:r>
           </a:p>
         </p:txBody>
@@ -6064,404 +5821,6 @@
           </a:prstGeom>
         </p:spPr>
       </p:pic>
-      <p:graphicFrame>
-        <p:nvGraphicFramePr>
-          <p:cNvPr id="17" name="Table 16">
-            <a:extLst>
-              <a:ext uri="{FF2B5EF4-FFF2-40B4-BE49-F238E27FC236}">
-                <a16:creationId xmlns:a16="http://schemas.microsoft.com/office/drawing/2014/main" id="{B33F8BC2-7053-6143-87C5-971302543526}"/>
-              </a:ext>
-            </a:extLst>
-          </p:cNvPr>
-          <p:cNvGraphicFramePr>
-            <a:graphicFrameLocks noGrp="1"/>
-          </p:cNvGraphicFramePr>
-          <p:nvPr>
-            <p:extLst>
-              <p:ext uri="{D42A27DB-BD31-4B8C-83A1-F6EECF244321}">
-                <p14:modId xmlns:p14="http://schemas.microsoft.com/office/powerpoint/2010/main" val="828910108"/>
-              </p:ext>
-            </p:extLst>
-          </p:nvPr>
-        </p:nvGraphicFramePr>
-        <p:xfrm>
-          <a:off x="6738658" y="7048537"/>
-          <a:ext cx="7614368" cy="3479800"/>
-        </p:xfrm>
-        <a:graphic>
-          <a:graphicData uri="http://schemas.openxmlformats.org/drawingml/2006/table">
-            <a:tbl>
-              <a:tblPr firstRow="1" bandRow="1">
-                <a:tableStyleId>{5C22544A-7EE6-4342-B048-85BDC9FD1C3A}</a:tableStyleId>
-              </a:tblPr>
-              <a:tblGrid>
-                <a:gridCol w="1121210">
-                  <a:extLst>
-                    <a:ext uri="{9D8B030D-6E8A-4147-A177-3AD203B41FA5}">
-                      <a16:colId xmlns:a16="http://schemas.microsoft.com/office/drawing/2014/main" val="1077954340"/>
-                    </a:ext>
-                  </a:extLst>
-                </a:gridCol>
-                <a:gridCol w="1360332">
-                  <a:extLst>
-                    <a:ext uri="{9D8B030D-6E8A-4147-A177-3AD203B41FA5}">
-                      <a16:colId xmlns:a16="http://schemas.microsoft.com/office/drawing/2014/main" val="1781208849"/>
-                    </a:ext>
-                  </a:extLst>
-                </a:gridCol>
-                <a:gridCol w="1941473">
-                  <a:extLst>
-                    <a:ext uri="{9D8B030D-6E8A-4147-A177-3AD203B41FA5}">
-                      <a16:colId xmlns:a16="http://schemas.microsoft.com/office/drawing/2014/main" val="1309071497"/>
-                    </a:ext>
-                  </a:extLst>
-                </a:gridCol>
-                <a:gridCol w="1210155">
-                  <a:extLst>
-                    <a:ext uri="{9D8B030D-6E8A-4147-A177-3AD203B41FA5}">
-                      <a16:colId xmlns:a16="http://schemas.microsoft.com/office/drawing/2014/main" val="3419688354"/>
-                    </a:ext>
-                  </a:extLst>
-                </a:gridCol>
-                <a:gridCol w="1981198">
-                  <a:extLst>
-                    <a:ext uri="{9D8B030D-6E8A-4147-A177-3AD203B41FA5}">
-                      <a16:colId xmlns:a16="http://schemas.microsoft.com/office/drawing/2014/main" val="1497112927"/>
-                    </a:ext>
-                  </a:extLst>
-                </a:gridCol>
-              </a:tblGrid>
-              <a:tr h="370840">
-                <a:tc>
-                  <a:txBody>
-                    <a:bodyPr/>
-                    <a:lstStyle/>
-                    <a:p>
-                      <a:r>
-                        <a:rPr lang="en-US" dirty="0"/>
-                        <a:t>Carrier</a:t>
-                      </a:r>
-                    </a:p>
-                  </a:txBody>
-                  <a:tcPr/>
-                </a:tc>
-                <a:tc>
-                  <a:txBody>
-                    <a:bodyPr/>
-                    <a:lstStyle/>
-                    <a:p>
-                      <a:r>
-                        <a:rPr lang="en-US" dirty="0"/>
-                        <a:t>Destination</a:t>
-                      </a:r>
-                    </a:p>
-                  </a:txBody>
-                  <a:tcPr/>
-                </a:tc>
-                <a:tc>
-                  <a:txBody>
-                    <a:bodyPr/>
-                    <a:lstStyle/>
-                    <a:p>
-                      <a:r>
-                        <a:rPr lang="en-US" dirty="0"/>
-                        <a:t>Time of Day</a:t>
-                      </a:r>
-                    </a:p>
-                  </a:txBody>
-                  <a:tcPr/>
-                </a:tc>
-                <a:tc>
-                  <a:txBody>
-                    <a:bodyPr/>
-                    <a:lstStyle/>
-                    <a:p>
-                      <a:r>
-                        <a:rPr lang="en-US" dirty="0"/>
-                        <a:t>Weekday</a:t>
-                      </a:r>
-                    </a:p>
-                  </a:txBody>
-                  <a:tcPr/>
-                </a:tc>
-                <a:tc>
-                  <a:txBody>
-                    <a:bodyPr/>
-                    <a:lstStyle/>
-                    <a:p>
-                      <a:r>
-                        <a:rPr lang="en-US" dirty="0"/>
-                        <a:t>Month</a:t>
-                      </a:r>
-                    </a:p>
-                  </a:txBody>
-                  <a:tcPr/>
-                </a:tc>
-                <a:extLst>
-                  <a:ext uri="{0D108BD9-81ED-4DB2-BD59-A6C34878D82A}">
-                    <a16:rowId xmlns:a16="http://schemas.microsoft.com/office/drawing/2014/main" val="665170446"/>
-                  </a:ext>
-                </a:extLst>
-              </a:tr>
-              <a:tr h="370840">
-                <a:tc>
-                  <a:txBody>
-                    <a:bodyPr/>
-                    <a:lstStyle/>
-                    <a:p>
-                      <a:r>
-                        <a:rPr lang="en-US" dirty="0"/>
-                        <a:t>Jet Blue</a:t>
-                      </a:r>
-                    </a:p>
-                    <a:p>
-                      <a:r>
-                        <a:rPr lang="en-US" dirty="0"/>
-                        <a:t>Southwest</a:t>
-                      </a:r>
-                    </a:p>
-                    <a:p>
-                      <a:r>
-                        <a:rPr lang="en-US" dirty="0"/>
-                        <a:t>United</a:t>
-                      </a:r>
-                    </a:p>
-                    <a:p>
-                      <a:r>
-                        <a:rPr lang="en-US" dirty="0"/>
-                        <a:t>Express Jet</a:t>
-                      </a:r>
-                    </a:p>
-                    <a:p>
-                      <a:r>
-                        <a:rPr lang="en-US" dirty="0"/>
-                        <a:t>American</a:t>
-                      </a:r>
-                    </a:p>
-                    <a:p>
-                      <a:r>
-                        <a:rPr lang="en-US" dirty="0"/>
-                        <a:t>Delta</a:t>
-                      </a:r>
-                    </a:p>
-                    <a:p>
-                      <a:r>
-                        <a:rPr lang="en-US" dirty="0"/>
-                        <a:t>Alaska</a:t>
-                      </a:r>
-                    </a:p>
-                  </a:txBody>
-                  <a:tcPr/>
-                </a:tc>
-                <a:tc>
-                  <a:txBody>
-                    <a:bodyPr/>
-                    <a:lstStyle/>
-                    <a:p>
-                      <a:r>
-                        <a:rPr lang="en-US" dirty="0"/>
-                        <a:t>ORF</a:t>
-                      </a:r>
-                    </a:p>
-                    <a:p>
-                      <a:endParaRPr lang="en-US" dirty="0"/>
-                    </a:p>
-                    <a:p>
-                      <a:r>
-                        <a:rPr lang="en-US" dirty="0"/>
-                        <a:t>…</a:t>
-                      </a:r>
-                    </a:p>
-                    <a:p>
-                      <a:endParaRPr lang="en-US" dirty="0"/>
-                    </a:p>
-                    <a:p>
-                      <a:endParaRPr lang="en-US" dirty="0"/>
-                    </a:p>
-                    <a:p>
-                      <a:endParaRPr lang="en-US" dirty="0"/>
-                    </a:p>
-                    <a:p>
-                      <a:endParaRPr lang="en-US" dirty="0"/>
-                    </a:p>
-                    <a:p>
-                      <a:endParaRPr lang="en-US" dirty="0"/>
-                    </a:p>
-                    <a:p>
-                      <a:r>
-                        <a:rPr lang="en-US" dirty="0"/>
-                        <a:t>PDX</a:t>
-                      </a:r>
-                    </a:p>
-                  </a:txBody>
-                  <a:tcPr/>
-                </a:tc>
-                <a:tc>
-                  <a:txBody>
-                    <a:bodyPr/>
-                    <a:lstStyle/>
-                    <a:p>
-                      <a:r>
-                        <a:rPr lang="en-US" dirty="0"/>
-                        <a:t>Evening (1800-2400)</a:t>
-                      </a:r>
-                    </a:p>
-                    <a:p>
-                      <a:r>
-                        <a:rPr lang="en-US" dirty="0"/>
-                        <a:t>Afternoon (1200-1800)</a:t>
-                      </a:r>
-                    </a:p>
-                    <a:p>
-                      <a:r>
-                        <a:rPr lang="en-US" dirty="0"/>
-                        <a:t>Morning (0600-1200)</a:t>
-                      </a:r>
-                    </a:p>
-                    <a:p>
-                      <a:r>
-                        <a:rPr lang="en-US" dirty="0"/>
-                        <a:t>Night (2400-0600)</a:t>
-                      </a:r>
-                    </a:p>
-                  </a:txBody>
-                  <a:tcPr/>
-                </a:tc>
-                <a:tc>
-                  <a:txBody>
-                    <a:bodyPr/>
-                    <a:lstStyle/>
-                    <a:p>
-                      <a:r>
-                        <a:rPr lang="en-US" dirty="0"/>
-                        <a:t>Thursday</a:t>
-                      </a:r>
-                    </a:p>
-                    <a:p>
-                      <a:r>
-                        <a:rPr lang="en-US" dirty="0"/>
-                        <a:t>Friday</a:t>
-                      </a:r>
-                    </a:p>
-                    <a:p>
-                      <a:r>
-                        <a:rPr lang="en-US" dirty="0"/>
-                        <a:t>Monday</a:t>
-                      </a:r>
-                    </a:p>
-                    <a:p>
-                      <a:r>
-                        <a:rPr lang="en-US" dirty="0"/>
-                        <a:t>Tuesday</a:t>
-                      </a:r>
-                    </a:p>
-                    <a:p>
-                      <a:r>
-                        <a:rPr lang="en-US" dirty="0"/>
-                        <a:t>Wednesday</a:t>
-                      </a:r>
-                    </a:p>
-                    <a:p>
-                      <a:r>
-                        <a:rPr lang="en-US" dirty="0"/>
-                        <a:t>Sunday</a:t>
-                      </a:r>
-                    </a:p>
-                    <a:p>
-                      <a:r>
-                        <a:rPr lang="en-US" dirty="0"/>
-                        <a:t>Saturday</a:t>
-                      </a:r>
-                    </a:p>
-                    <a:p>
-                      <a:endParaRPr lang="en-US" dirty="0"/>
-                    </a:p>
-                  </a:txBody>
-                  <a:tcPr/>
-                </a:tc>
-                <a:tc>
-                  <a:txBody>
-                    <a:bodyPr/>
-                    <a:lstStyle/>
-                    <a:p>
-                      <a:r>
-                        <a:rPr lang="en-US" dirty="0"/>
-                        <a:t>July</a:t>
-                      </a:r>
-                    </a:p>
-                    <a:p>
-                      <a:r>
-                        <a:rPr lang="en-US" dirty="0"/>
-                        <a:t>June</a:t>
-                      </a:r>
-                    </a:p>
-                    <a:p>
-                      <a:r>
-                        <a:rPr lang="en-US" dirty="0"/>
-                        <a:t>August</a:t>
-                      </a:r>
-                    </a:p>
-                    <a:p>
-                      <a:r>
-                        <a:rPr lang="en-US" dirty="0"/>
-                        <a:t>May</a:t>
-                      </a:r>
-                    </a:p>
-                    <a:p>
-                      <a:r>
-                        <a:rPr lang="en-US" dirty="0"/>
-                        <a:t>April</a:t>
-                      </a:r>
-                    </a:p>
-                    <a:p>
-                      <a:r>
-                        <a:rPr lang="en-US" dirty="0"/>
-                        <a:t>March</a:t>
-                      </a:r>
-                    </a:p>
-                    <a:p>
-                      <a:r>
-                        <a:rPr lang="en-US" dirty="0"/>
-                        <a:t>February</a:t>
-                      </a:r>
-                    </a:p>
-                    <a:p>
-                      <a:r>
-                        <a:rPr lang="en-US" dirty="0"/>
-                        <a:t>January</a:t>
-                      </a:r>
-                    </a:p>
-                    <a:p>
-                      <a:r>
-                        <a:rPr lang="en-US" dirty="0"/>
-                        <a:t>October</a:t>
-                      </a:r>
-                    </a:p>
-                    <a:p>
-                      <a:r>
-                        <a:rPr lang="en-US" dirty="0"/>
-                        <a:t>September</a:t>
-                      </a:r>
-                    </a:p>
-                    <a:p>
-                      <a:r>
-                        <a:rPr lang="en-US" dirty="0"/>
-                        <a:t>November</a:t>
-                      </a:r>
-                    </a:p>
-                  </a:txBody>
-                  <a:tcPr/>
-                </a:tc>
-                <a:extLst>
-                  <a:ext uri="{0D108BD9-81ED-4DB2-BD59-A6C34878D82A}">
-                    <a16:rowId xmlns:a16="http://schemas.microsoft.com/office/drawing/2014/main" val="370178054"/>
-                  </a:ext>
-                </a:extLst>
-              </a:tr>
-            </a:tbl>
-          </a:graphicData>
-        </a:graphic>
-      </p:graphicFrame>
       <p:pic>
         <p:nvPicPr>
           <p:cNvPr id="13" name="Picture 12">
@@ -6536,42 +5895,6 @@
       </p:pic>
       <p:pic>
         <p:nvPicPr>
-          <p:cNvPr id="6" name="Picture 5">
-            <a:extLst>
-              <a:ext uri="{FF2B5EF4-FFF2-40B4-BE49-F238E27FC236}">
-                <a16:creationId xmlns:a16="http://schemas.microsoft.com/office/drawing/2014/main" id="{EF0572B8-DD3F-384B-B879-37C30F28CEFF}"/>
-              </a:ext>
-            </a:extLst>
-          </p:cNvPr>
-          <p:cNvPicPr>
-            <a:picLocks noChangeAspect="1"/>
-          </p:cNvPicPr>
-          <p:nvPr/>
-        </p:nvPicPr>
-        <p:blipFill>
-          <a:blip r:embed="rId9">
-            <a:extLst>
-              <a:ext uri="{28A0092B-C50C-407E-A947-70E740481C1C}">
-                <a14:useLocalDpi xmlns:a14="http://schemas.microsoft.com/office/drawing/2010/main" val="0"/>
-              </a:ext>
-            </a:extLst>
-          </a:blip>
-          <a:stretch>
-            <a:fillRect/>
-          </a:stretch>
-        </p:blipFill>
-        <p:spPr>
-          <a:xfrm>
-            <a:off x="18574074" y="9570222"/>
-            <a:ext cx="5510485" cy="2492293"/>
-          </a:xfrm>
-          <a:prstGeom prst="rect">
-            <a:avLst/>
-          </a:prstGeom>
-        </p:spPr>
-      </p:pic>
-      <p:pic>
-        <p:nvPicPr>
           <p:cNvPr id="43" name="Picture 42">
             <a:extLst>
               <a:ext uri="{FF2B5EF4-FFF2-40B4-BE49-F238E27FC236}">
@@ -6592,13 +5915,13 @@
               </a:ext>
             </a:extLst>
           </a:blip>
-          <a:srcRect r="25919" b="18462"/>
+          <a:srcRect r="30959" b="18462"/>
           <a:stretch/>
         </p:blipFill>
         <p:spPr>
           <a:xfrm>
-            <a:off x="6014614" y="1604778"/>
-            <a:ext cx="5483671" cy="2729842"/>
+            <a:off x="6014616" y="1622506"/>
+            <a:ext cx="5521799" cy="2949493"/>
           </a:xfrm>
           <a:prstGeom prst="rect">
             <a:avLst/>
@@ -6657,7 +5980,7 @@
         </p:nvCxnSpPr>
         <p:spPr>
           <a:xfrm>
-            <a:off x="6299306" y="7315200"/>
+            <a:off x="6188079" y="7484406"/>
             <a:ext cx="0" cy="3247094"/>
           </a:xfrm>
           <a:prstGeom prst="straightConnector1">
@@ -6683,6 +6006,789 @@
           </a:fontRef>
         </p:style>
       </p:cxnSp>
+      <p:pic>
+        <p:nvPicPr>
+          <p:cNvPr id="48" name="Picture 47">
+            <a:extLst>
+              <a:ext uri="{FF2B5EF4-FFF2-40B4-BE49-F238E27FC236}">
+                <a16:creationId xmlns:a16="http://schemas.microsoft.com/office/drawing/2014/main" id="{8B62D3D9-9B55-2C45-AF90-07509C6C1396}"/>
+              </a:ext>
+            </a:extLst>
+          </p:cNvPr>
+          <p:cNvPicPr>
+            <a:picLocks noChangeAspect="1"/>
+          </p:cNvPicPr>
+          <p:nvPr/>
+        </p:nvPicPr>
+        <p:blipFill rotWithShape="1">
+          <a:blip r:embed="rId9">
+            <a:extLst>
+              <a:ext uri="{28A0092B-C50C-407E-A947-70E740481C1C}">
+                <a14:useLocalDpi xmlns:a14="http://schemas.microsoft.com/office/drawing/2010/main" val="0"/>
+              </a:ext>
+            </a:extLst>
+          </a:blip>
+          <a:srcRect l="82476" t="10415" r="5629" b="52895"/>
+          <a:stretch/>
+        </p:blipFill>
+        <p:spPr>
+          <a:xfrm>
+            <a:off x="6081271" y="3481601"/>
+            <a:ext cx="655503" cy="914401"/>
+          </a:xfrm>
+          <a:prstGeom prst="rect">
+            <a:avLst/>
+          </a:prstGeom>
+        </p:spPr>
+      </p:pic>
+      <p:sp>
+        <p:nvSpPr>
+          <p:cNvPr id="52" name="Oval 51">
+            <a:extLst>
+              <a:ext uri="{FF2B5EF4-FFF2-40B4-BE49-F238E27FC236}">
+                <a16:creationId xmlns:a16="http://schemas.microsoft.com/office/drawing/2014/main" id="{1CA5A2A3-8F73-C948-AED7-9DC96213E7DE}"/>
+              </a:ext>
+            </a:extLst>
+          </p:cNvPr>
+          <p:cNvSpPr/>
+          <p:nvPr/>
+        </p:nvSpPr>
+        <p:spPr>
+          <a:xfrm>
+            <a:off x="6188079" y="3857946"/>
+            <a:ext cx="93978" cy="102191"/>
+          </a:xfrm>
+          <a:prstGeom prst="ellipse">
+            <a:avLst/>
+          </a:prstGeom>
+          <a:solidFill>
+            <a:srgbClr val="4E79A7"/>
+          </a:solidFill>
+          <a:ln>
+            <a:solidFill>
+              <a:srgbClr val="4E79A7"/>
+            </a:solidFill>
+          </a:ln>
+          <a:effectLst/>
+        </p:spPr>
+        <p:style>
+          <a:lnRef idx="1">
+            <a:schemeClr val="accent1"/>
+          </a:lnRef>
+          <a:fillRef idx="3">
+            <a:schemeClr val="accent1"/>
+          </a:fillRef>
+          <a:effectRef idx="2">
+            <a:schemeClr val="accent1"/>
+          </a:effectRef>
+          <a:fontRef idx="minor">
+            <a:schemeClr val="lt1"/>
+          </a:fontRef>
+        </p:style>
+        <p:txBody>
+          <a:bodyPr rtlCol="0" anchor="ctr"/>
+          <a:lstStyle/>
+          <a:p>
+            <a:pPr algn="ctr"/>
+            <a:endParaRPr lang="en-US"/>
+          </a:p>
+        </p:txBody>
+      </p:sp>
+      <p:sp>
+        <p:nvSpPr>
+          <p:cNvPr id="53" name="Oval 52">
+            <a:extLst>
+              <a:ext uri="{FF2B5EF4-FFF2-40B4-BE49-F238E27FC236}">
+                <a16:creationId xmlns:a16="http://schemas.microsoft.com/office/drawing/2014/main" id="{8FDDD4CB-7187-4748-A8C2-AF1FD0FC8BA6}"/>
+              </a:ext>
+            </a:extLst>
+          </p:cNvPr>
+          <p:cNvSpPr/>
+          <p:nvPr/>
+        </p:nvSpPr>
+        <p:spPr>
+          <a:xfrm>
+            <a:off x="6196311" y="3757324"/>
+            <a:ext cx="77248" cy="77248"/>
+          </a:xfrm>
+          <a:prstGeom prst="ellipse">
+            <a:avLst/>
+          </a:prstGeom>
+          <a:solidFill>
+            <a:srgbClr val="4E79A7"/>
+          </a:solidFill>
+          <a:ln>
+            <a:solidFill>
+              <a:srgbClr val="4E79A7"/>
+            </a:solidFill>
+          </a:ln>
+          <a:effectLst/>
+        </p:spPr>
+        <p:style>
+          <a:lnRef idx="1">
+            <a:schemeClr val="accent1"/>
+          </a:lnRef>
+          <a:fillRef idx="3">
+            <a:schemeClr val="accent1"/>
+          </a:fillRef>
+          <a:effectRef idx="2">
+            <a:schemeClr val="accent1"/>
+          </a:effectRef>
+          <a:fontRef idx="minor">
+            <a:schemeClr val="lt1"/>
+          </a:fontRef>
+        </p:style>
+        <p:txBody>
+          <a:bodyPr rtlCol="0" anchor="ctr"/>
+          <a:lstStyle/>
+          <a:p>
+            <a:pPr algn="ctr"/>
+            <a:endParaRPr lang="en-US"/>
+          </a:p>
+        </p:txBody>
+      </p:sp>
+      <p:sp>
+        <p:nvSpPr>
+          <p:cNvPr id="54" name="Oval 53">
+            <a:extLst>
+              <a:ext uri="{FF2B5EF4-FFF2-40B4-BE49-F238E27FC236}">
+                <a16:creationId xmlns:a16="http://schemas.microsoft.com/office/drawing/2014/main" id="{DA18099A-5901-A84A-B42F-92843AFDC07A}"/>
+              </a:ext>
+            </a:extLst>
+          </p:cNvPr>
+          <p:cNvSpPr/>
+          <p:nvPr/>
+        </p:nvSpPr>
+        <p:spPr>
+          <a:xfrm>
+            <a:off x="6212076" y="3655565"/>
+            <a:ext cx="45719" cy="45719"/>
+          </a:xfrm>
+          <a:prstGeom prst="ellipse">
+            <a:avLst/>
+          </a:prstGeom>
+          <a:solidFill>
+            <a:srgbClr val="4E79A7"/>
+          </a:solidFill>
+          <a:ln>
+            <a:solidFill>
+              <a:srgbClr val="4E79A7"/>
+            </a:solidFill>
+          </a:ln>
+          <a:effectLst/>
+        </p:spPr>
+        <p:style>
+          <a:lnRef idx="1">
+            <a:schemeClr val="accent1"/>
+          </a:lnRef>
+          <a:fillRef idx="3">
+            <a:schemeClr val="accent1"/>
+          </a:fillRef>
+          <a:effectRef idx="2">
+            <a:schemeClr val="accent1"/>
+          </a:effectRef>
+          <a:fontRef idx="minor">
+            <a:schemeClr val="lt1"/>
+          </a:fontRef>
+        </p:style>
+        <p:txBody>
+          <a:bodyPr rtlCol="0" anchor="ctr"/>
+          <a:lstStyle/>
+          <a:p>
+            <a:pPr algn="ctr"/>
+            <a:endParaRPr lang="en-US"/>
+          </a:p>
+        </p:txBody>
+      </p:sp>
+      <p:sp>
+        <p:nvSpPr>
+          <p:cNvPr id="55" name="Oval 54">
+            <a:extLst>
+              <a:ext uri="{FF2B5EF4-FFF2-40B4-BE49-F238E27FC236}">
+                <a16:creationId xmlns:a16="http://schemas.microsoft.com/office/drawing/2014/main" id="{5B3DAF95-59F8-9D41-A7E0-C7F7EC4A02E5}"/>
+              </a:ext>
+            </a:extLst>
+          </p:cNvPr>
+          <p:cNvSpPr/>
+          <p:nvPr/>
+        </p:nvSpPr>
+        <p:spPr>
+          <a:xfrm>
+            <a:off x="6176822" y="3973300"/>
+            <a:ext cx="116226" cy="126383"/>
+          </a:xfrm>
+          <a:prstGeom prst="ellipse">
+            <a:avLst/>
+          </a:prstGeom>
+          <a:solidFill>
+            <a:srgbClr val="4E79A7"/>
+          </a:solidFill>
+          <a:ln>
+            <a:solidFill>
+              <a:srgbClr val="4E79A7"/>
+            </a:solidFill>
+          </a:ln>
+          <a:effectLst/>
+        </p:spPr>
+        <p:style>
+          <a:lnRef idx="1">
+            <a:schemeClr val="accent1"/>
+          </a:lnRef>
+          <a:fillRef idx="3">
+            <a:schemeClr val="accent1"/>
+          </a:fillRef>
+          <a:effectRef idx="2">
+            <a:schemeClr val="accent1"/>
+          </a:effectRef>
+          <a:fontRef idx="minor">
+            <a:schemeClr val="lt1"/>
+          </a:fontRef>
+        </p:style>
+        <p:txBody>
+          <a:bodyPr rtlCol="0" anchor="ctr"/>
+          <a:lstStyle/>
+          <a:p>
+            <a:pPr algn="ctr"/>
+            <a:endParaRPr lang="en-US"/>
+          </a:p>
+        </p:txBody>
+      </p:sp>
+      <p:sp>
+        <p:nvSpPr>
+          <p:cNvPr id="56" name="Oval 55">
+            <a:extLst>
+              <a:ext uri="{FF2B5EF4-FFF2-40B4-BE49-F238E27FC236}">
+                <a16:creationId xmlns:a16="http://schemas.microsoft.com/office/drawing/2014/main" id="{CA6DBF1A-13D4-0C43-90A6-9E8B37CEE75F}"/>
+              </a:ext>
+            </a:extLst>
+          </p:cNvPr>
+          <p:cNvSpPr/>
+          <p:nvPr/>
+        </p:nvSpPr>
+        <p:spPr>
+          <a:xfrm>
+            <a:off x="6176358" y="4109895"/>
+            <a:ext cx="117154" cy="127392"/>
+          </a:xfrm>
+          <a:prstGeom prst="ellipse">
+            <a:avLst/>
+          </a:prstGeom>
+          <a:solidFill>
+            <a:srgbClr val="4E79A7"/>
+          </a:solidFill>
+          <a:ln>
+            <a:solidFill>
+              <a:srgbClr val="4E79A7"/>
+            </a:solidFill>
+          </a:ln>
+          <a:effectLst/>
+        </p:spPr>
+        <p:style>
+          <a:lnRef idx="1">
+            <a:schemeClr val="accent1"/>
+          </a:lnRef>
+          <a:fillRef idx="3">
+            <a:schemeClr val="accent1"/>
+          </a:fillRef>
+          <a:effectRef idx="2">
+            <a:schemeClr val="accent1"/>
+          </a:effectRef>
+          <a:fontRef idx="minor">
+            <a:schemeClr val="lt1"/>
+          </a:fontRef>
+        </p:style>
+        <p:txBody>
+          <a:bodyPr rtlCol="0" anchor="ctr"/>
+          <a:lstStyle/>
+          <a:p>
+            <a:pPr algn="ctr"/>
+            <a:endParaRPr lang="en-US"/>
+          </a:p>
+        </p:txBody>
+      </p:sp>
+      <p:sp>
+        <p:nvSpPr>
+          <p:cNvPr id="57" name="Oval 56">
+            <a:extLst>
+              <a:ext uri="{FF2B5EF4-FFF2-40B4-BE49-F238E27FC236}">
+                <a16:creationId xmlns:a16="http://schemas.microsoft.com/office/drawing/2014/main" id="{D10E6E50-1D84-954D-9CF2-D87F54312AB1}"/>
+              </a:ext>
+            </a:extLst>
+          </p:cNvPr>
+          <p:cNvSpPr/>
+          <p:nvPr/>
+        </p:nvSpPr>
+        <p:spPr>
+          <a:xfrm>
+            <a:off x="6170564" y="4245961"/>
+            <a:ext cx="128742" cy="139993"/>
+          </a:xfrm>
+          <a:prstGeom prst="ellipse">
+            <a:avLst/>
+          </a:prstGeom>
+          <a:solidFill>
+            <a:srgbClr val="4E79A7"/>
+          </a:solidFill>
+          <a:ln>
+            <a:solidFill>
+              <a:srgbClr val="4E79A7"/>
+            </a:solidFill>
+          </a:ln>
+          <a:effectLst/>
+        </p:spPr>
+        <p:style>
+          <a:lnRef idx="1">
+            <a:schemeClr val="accent1"/>
+          </a:lnRef>
+          <a:fillRef idx="3">
+            <a:schemeClr val="accent1"/>
+          </a:fillRef>
+          <a:effectRef idx="2">
+            <a:schemeClr val="accent1"/>
+          </a:effectRef>
+          <a:fontRef idx="minor">
+            <a:schemeClr val="lt1"/>
+          </a:fontRef>
+        </p:style>
+        <p:txBody>
+          <a:bodyPr rtlCol="0" anchor="ctr"/>
+          <a:lstStyle/>
+          <a:p>
+            <a:pPr algn="ctr"/>
+            <a:endParaRPr lang="en-US"/>
+          </a:p>
+        </p:txBody>
+      </p:sp>
+      <p:cxnSp>
+        <p:nvCxnSpPr>
+          <p:cNvPr id="58" name="Straight Connector 57">
+            <a:extLst>
+              <a:ext uri="{FF2B5EF4-FFF2-40B4-BE49-F238E27FC236}">
+                <a16:creationId xmlns:a16="http://schemas.microsoft.com/office/drawing/2014/main" id="{EC07FE94-C5B4-7D4D-86EA-25D409F81A09}"/>
+              </a:ext>
+            </a:extLst>
+          </p:cNvPr>
+          <p:cNvCxnSpPr>
+            <a:cxnSpLocks/>
+          </p:cNvCxnSpPr>
+          <p:nvPr/>
+        </p:nvCxnSpPr>
+        <p:spPr>
+          <a:xfrm flipH="1" flipV="1">
+            <a:off x="5983540" y="4556148"/>
+            <a:ext cx="5605493" cy="61"/>
+          </a:xfrm>
+          <a:prstGeom prst="line">
+            <a:avLst/>
+          </a:prstGeom>
+          <a:ln w="31750">
+            <a:solidFill>
+              <a:schemeClr val="accent1"/>
+            </a:solidFill>
+            <a:prstDash val="solid"/>
+          </a:ln>
+        </p:spPr>
+        <p:style>
+          <a:lnRef idx="1">
+            <a:schemeClr val="accent1"/>
+          </a:lnRef>
+          <a:fillRef idx="0">
+            <a:schemeClr val="accent1"/>
+          </a:fillRef>
+          <a:effectRef idx="0">
+            <a:schemeClr val="accent1"/>
+          </a:effectRef>
+          <a:fontRef idx="minor">
+            <a:schemeClr val="tx1"/>
+          </a:fontRef>
+        </p:style>
+      </p:cxnSp>
+      <p:graphicFrame>
+        <p:nvGraphicFramePr>
+          <p:cNvPr id="68" name="Table 67">
+            <a:extLst>
+              <a:ext uri="{FF2B5EF4-FFF2-40B4-BE49-F238E27FC236}">
+                <a16:creationId xmlns:a16="http://schemas.microsoft.com/office/drawing/2014/main" id="{9B067F6D-6C9B-D24B-8FF2-D91B33D269DC}"/>
+              </a:ext>
+            </a:extLst>
+          </p:cNvPr>
+          <p:cNvGraphicFramePr>
+            <a:graphicFrameLocks noGrp="1"/>
+          </p:cNvGraphicFramePr>
+          <p:nvPr>
+            <p:extLst>
+              <p:ext uri="{D42A27DB-BD31-4B8C-83A1-F6EECF244321}">
+                <p14:modId xmlns:p14="http://schemas.microsoft.com/office/powerpoint/2010/main" val="3113726906"/>
+              </p:ext>
+            </p:extLst>
+          </p:nvPr>
+        </p:nvGraphicFramePr>
+        <p:xfrm>
+          <a:off x="11695841" y="1643011"/>
+          <a:ext cx="5487932" cy="2024449"/>
+        </p:xfrm>
+        <a:graphic>
+          <a:graphicData uri="http://schemas.openxmlformats.org/drawingml/2006/table">
+            <a:tbl>
+              <a:tblPr firstRow="1" bandRow="1">
+                <a:tableStyleId>{5C22544A-7EE6-4342-B048-85BDC9FD1C3A}</a:tableStyleId>
+              </a:tblPr>
+              <a:tblGrid>
+                <a:gridCol w="1371983">
+                  <a:extLst>
+                    <a:ext uri="{9D8B030D-6E8A-4147-A177-3AD203B41FA5}">
+                      <a16:colId xmlns:a16="http://schemas.microsoft.com/office/drawing/2014/main" val="3655027934"/>
+                    </a:ext>
+                  </a:extLst>
+                </a:gridCol>
+                <a:gridCol w="1371983">
+                  <a:extLst>
+                    <a:ext uri="{9D8B030D-6E8A-4147-A177-3AD203B41FA5}">
+                      <a16:colId xmlns:a16="http://schemas.microsoft.com/office/drawing/2014/main" val="3498593769"/>
+                    </a:ext>
+                  </a:extLst>
+                </a:gridCol>
+                <a:gridCol w="1371983">
+                  <a:extLst>
+                    <a:ext uri="{9D8B030D-6E8A-4147-A177-3AD203B41FA5}">
+                      <a16:colId xmlns:a16="http://schemas.microsoft.com/office/drawing/2014/main" val="2445888722"/>
+                    </a:ext>
+                  </a:extLst>
+                </a:gridCol>
+                <a:gridCol w="1371983">
+                  <a:extLst>
+                    <a:ext uri="{9D8B030D-6E8A-4147-A177-3AD203B41FA5}">
+                      <a16:colId xmlns:a16="http://schemas.microsoft.com/office/drawing/2014/main" val="2501869834"/>
+                    </a:ext>
+                  </a:extLst>
+                </a:gridCol>
+              </a:tblGrid>
+              <a:tr h="275253">
+                <a:tc>
+                  <a:txBody>
+                    <a:bodyPr/>
+                    <a:lstStyle/>
+                    <a:p>
+                      <a:pPr algn="ctr"/>
+                      <a:r>
+                        <a:rPr lang="en-US" sz="1200" dirty="0"/>
+                        <a:t>Model</a:t>
+                      </a:r>
+                    </a:p>
+                  </a:txBody>
+                  <a:tcPr anchor="ctr"/>
+                </a:tc>
+                <a:tc>
+                  <a:txBody>
+                    <a:bodyPr/>
+                    <a:lstStyle/>
+                    <a:p>
+                      <a:pPr algn="ctr"/>
+                      <a:r>
+                        <a:rPr lang="en-US" sz="1200" dirty="0"/>
+                        <a:t>OSR2</a:t>
+                      </a:r>
+                    </a:p>
+                  </a:txBody>
+                  <a:tcPr anchor="ctr"/>
+                </a:tc>
+                <a:tc>
+                  <a:txBody>
+                    <a:bodyPr/>
+                    <a:lstStyle/>
+                    <a:p>
+                      <a:pPr algn="ctr"/>
+                      <a:r>
+                        <a:rPr lang="en-US" sz="1200" dirty="0"/>
+                        <a:t>MAE</a:t>
+                      </a:r>
+                    </a:p>
+                  </a:txBody>
+                  <a:tcPr anchor="ctr"/>
+                </a:tc>
+                <a:tc>
+                  <a:txBody>
+                    <a:bodyPr/>
+                    <a:lstStyle/>
+                    <a:p>
+                      <a:pPr algn="ctr"/>
+                      <a:r>
+                        <a:rPr lang="en-US" sz="1200" dirty="0"/>
+                        <a:t>RMSE</a:t>
+                      </a:r>
+                    </a:p>
+                  </a:txBody>
+                  <a:tcPr anchor="ctr"/>
+                </a:tc>
+                <a:extLst>
+                  <a:ext uri="{0D108BD9-81ED-4DB2-BD59-A6C34878D82A}">
+                    <a16:rowId xmlns:a16="http://schemas.microsoft.com/office/drawing/2014/main" val="3913714163"/>
+                  </a:ext>
+                </a:extLst>
+              </a:tr>
+              <a:tr h="387572">
+                <a:tc>
+                  <a:txBody>
+                    <a:bodyPr/>
+                    <a:lstStyle/>
+                    <a:p>
+                      <a:r>
+                        <a:rPr lang="en-US" sz="1200" dirty="0"/>
+                        <a:t>Linear Regression (all variables)</a:t>
+                      </a:r>
+                    </a:p>
+                  </a:txBody>
+                  <a:tcPr/>
+                </a:tc>
+                <a:tc>
+                  <a:txBody>
+                    <a:bodyPr/>
+                    <a:lstStyle/>
+                    <a:p>
+                      <a:r>
+                        <a:rPr lang="en-US" sz="1200" dirty="0"/>
+                        <a:t>0.03876</a:t>
+                      </a:r>
+                    </a:p>
+                  </a:txBody>
+                  <a:tcPr/>
+                </a:tc>
+                <a:tc>
+                  <a:txBody>
+                    <a:bodyPr/>
+                    <a:lstStyle/>
+                    <a:p>
+                      <a:r>
+                        <a:rPr lang="en-US" sz="1200" dirty="0"/>
+                        <a:t>26.31</a:t>
+                      </a:r>
+                    </a:p>
+                  </a:txBody>
+                  <a:tcPr/>
+                </a:tc>
+                <a:tc>
+                  <a:txBody>
+                    <a:bodyPr/>
+                    <a:lstStyle/>
+                    <a:p>
+                      <a:r>
+                        <a:rPr lang="en-US" sz="1200"/>
+                        <a:t>2040</a:t>
+                      </a:r>
+                      <a:endParaRPr lang="en-US" sz="1200" dirty="0"/>
+                    </a:p>
+                  </a:txBody>
+                  <a:tcPr/>
+                </a:tc>
+                <a:extLst>
+                  <a:ext uri="{0D108BD9-81ED-4DB2-BD59-A6C34878D82A}">
+                    <a16:rowId xmlns:a16="http://schemas.microsoft.com/office/drawing/2014/main" val="3514980448"/>
+                  </a:ext>
+                </a:extLst>
+              </a:tr>
+              <a:tr h="542601">
+                <a:tc>
+                  <a:txBody>
+                    <a:bodyPr/>
+                    <a:lstStyle/>
+                    <a:p>
+                      <a:r>
+                        <a:rPr lang="en-US" sz="1200" dirty="0"/>
+                        <a:t>Linear Regression Stepwise Variable Selection</a:t>
+                      </a:r>
+                    </a:p>
+                  </a:txBody>
+                  <a:tcPr/>
+                </a:tc>
+                <a:tc>
+                  <a:txBody>
+                    <a:bodyPr/>
+                    <a:lstStyle/>
+                    <a:p>
+                      <a:endParaRPr lang="en-US" sz="1200" dirty="0"/>
+                    </a:p>
+                  </a:txBody>
+                  <a:tcPr/>
+                </a:tc>
+                <a:tc>
+                  <a:txBody>
+                    <a:bodyPr/>
+                    <a:lstStyle/>
+                    <a:p>
+                      <a:endParaRPr lang="en-US" sz="1200" dirty="0"/>
+                    </a:p>
+                  </a:txBody>
+                  <a:tcPr/>
+                </a:tc>
+                <a:tc>
+                  <a:txBody>
+                    <a:bodyPr/>
+                    <a:lstStyle/>
+                    <a:p>
+                      <a:endParaRPr lang="en-US" sz="1200" dirty="0"/>
+                    </a:p>
+                  </a:txBody>
+                  <a:tcPr/>
+                </a:tc>
+                <a:extLst>
+                  <a:ext uri="{0D108BD9-81ED-4DB2-BD59-A6C34878D82A}">
+                    <a16:rowId xmlns:a16="http://schemas.microsoft.com/office/drawing/2014/main" val="2244400224"/>
+                  </a:ext>
+                </a:extLst>
+              </a:tr>
+              <a:tr h="232543">
+                <a:tc>
+                  <a:txBody>
+                    <a:bodyPr/>
+                    <a:lstStyle/>
+                    <a:p>
+                      <a:r>
+                        <a:rPr lang="en-US" sz="1200" dirty="0"/>
+                        <a:t>CART (cp = 0.</a:t>
+                      </a:r>
+                    </a:p>
+                  </a:txBody>
+                  <a:tcPr/>
+                </a:tc>
+                <a:tc>
+                  <a:txBody>
+                    <a:bodyPr/>
+                    <a:lstStyle/>
+                    <a:p>
+                      <a:endParaRPr lang="en-US" sz="1200" dirty="0"/>
+                    </a:p>
+                  </a:txBody>
+                  <a:tcPr/>
+                </a:tc>
+                <a:tc>
+                  <a:txBody>
+                    <a:bodyPr/>
+                    <a:lstStyle/>
+                    <a:p>
+                      <a:endParaRPr lang="en-US" sz="1200" dirty="0"/>
+                    </a:p>
+                  </a:txBody>
+                  <a:tcPr/>
+                </a:tc>
+                <a:tc>
+                  <a:txBody>
+                    <a:bodyPr/>
+                    <a:lstStyle/>
+                    <a:p>
+                      <a:endParaRPr lang="en-US" sz="1200" dirty="0"/>
+                    </a:p>
+                  </a:txBody>
+                  <a:tcPr/>
+                </a:tc>
+                <a:extLst>
+                  <a:ext uri="{0D108BD9-81ED-4DB2-BD59-A6C34878D82A}">
+                    <a16:rowId xmlns:a16="http://schemas.microsoft.com/office/drawing/2014/main" val="2953384077"/>
+                  </a:ext>
+                </a:extLst>
+              </a:tr>
+              <a:tr h="377596">
+                <a:tc>
+                  <a:txBody>
+                    <a:bodyPr/>
+                    <a:lstStyle/>
+                    <a:p>
+                      <a:r>
+                        <a:rPr lang="en-US" sz="1200" dirty="0"/>
+                        <a:t>Random Forest</a:t>
+                      </a:r>
+                    </a:p>
+                  </a:txBody>
+                  <a:tcPr/>
+                </a:tc>
+                <a:tc>
+                  <a:txBody>
+                    <a:bodyPr/>
+                    <a:lstStyle/>
+                    <a:p>
+                      <a:endParaRPr lang="en-US" sz="1200" dirty="0"/>
+                    </a:p>
+                  </a:txBody>
+                  <a:tcPr/>
+                </a:tc>
+                <a:tc>
+                  <a:txBody>
+                    <a:bodyPr/>
+                    <a:lstStyle/>
+                    <a:p>
+                      <a:endParaRPr lang="en-US" sz="1200" dirty="0"/>
+                    </a:p>
+                  </a:txBody>
+                  <a:tcPr/>
+                </a:tc>
+                <a:tc>
+                  <a:txBody>
+                    <a:bodyPr/>
+                    <a:lstStyle/>
+                    <a:p>
+                      <a:endParaRPr lang="en-US" sz="1200" dirty="0"/>
+                    </a:p>
+                  </a:txBody>
+                  <a:tcPr/>
+                </a:tc>
+                <a:extLst>
+                  <a:ext uri="{0D108BD9-81ED-4DB2-BD59-A6C34878D82A}">
+                    <a16:rowId xmlns:a16="http://schemas.microsoft.com/office/drawing/2014/main" val="406434146"/>
+                  </a:ext>
+                </a:extLst>
+              </a:tr>
+            </a:tbl>
+          </a:graphicData>
+        </a:graphic>
+      </p:graphicFrame>
+      <p:sp>
+        <p:nvSpPr>
+          <p:cNvPr id="69" name="TextBox 68">
+            <a:extLst>
+              <a:ext uri="{FF2B5EF4-FFF2-40B4-BE49-F238E27FC236}">
+                <a16:creationId xmlns:a16="http://schemas.microsoft.com/office/drawing/2014/main" id="{B3897332-7079-8E48-B1CF-3B3860B5A536}"/>
+              </a:ext>
+            </a:extLst>
+          </p:cNvPr>
+          <p:cNvSpPr txBox="1"/>
+          <p:nvPr/>
+        </p:nvSpPr>
+        <p:spPr>
+          <a:xfrm>
+            <a:off x="140383" y="8330663"/>
+            <a:ext cx="5780345" cy="646331"/>
+          </a:xfrm>
+          <a:prstGeom prst="rect">
+            <a:avLst/>
+          </a:prstGeom>
+          <a:noFill/>
+        </p:spPr>
+        <p:txBody>
+          <a:bodyPr wrap="square" rtlCol="0">
+            <a:spAutoFit/>
+          </a:bodyPr>
+          <a:lstStyle/>
+          <a:p>
+            <a:pPr marL="285750" indent="-285750">
+              <a:buFont typeface="Arial" panose="020B0604020202020204" pitchFamily="34" charset="0"/>
+              <a:buChar char="•"/>
+            </a:pPr>
+            <a:r>
+              <a:rPr lang="en-US" sz="1800" dirty="0"/>
+              <a:t>We scoped the</a:t>
+            </a:r>
+          </a:p>
+          <a:p>
+            <a:pPr marL="285750" indent="-285750">
+              <a:buFont typeface="Arial" panose="020B0604020202020204" pitchFamily="34" charset="0"/>
+              <a:buChar char="•"/>
+            </a:pPr>
+            <a:r>
+              <a:rPr lang="en-US" sz="1800" dirty="0"/>
+              <a:t> </a:t>
+            </a:r>
+          </a:p>
+        </p:txBody>
+      </p:sp>
     </p:spTree>
     <p:extLst>
       <p:ext uri="{BB962C8B-B14F-4D97-AF65-F5344CB8AC3E}">

</xml_diff>

<commit_message>
updated stepwise and added Delay Tree Plot to plots folder
</commit_message>
<xml_diff>
--- a/TM12_15.071_Term_Project_Poster.pptx
+++ b/TM12_15.071_Term_Project_Poster.pptx
@@ -6418,7 +6418,7 @@
           <p:nvPr>
             <p:extLst>
               <p:ext uri="{D42A27DB-BD31-4B8C-83A1-F6EECF244321}">
-                <p14:modId xmlns:p14="http://schemas.microsoft.com/office/powerpoint/2010/main" val="3113726906"/>
+                <p14:modId xmlns:p14="http://schemas.microsoft.com/office/powerpoint/2010/main" val="2184871560"/>
               </p:ext>
             </p:extLst>
           </p:nvPr>
@@ -6434,14 +6434,14 @@
                 <a:tableStyleId>{5C22544A-7EE6-4342-B048-85BDC9FD1C3A}</a:tableStyleId>
               </a:tblPr>
               <a:tblGrid>
-                <a:gridCol w="1371983">
+                <a:gridCol w="1410559">
                   <a:extLst>
                     <a:ext uri="{9D8B030D-6E8A-4147-A177-3AD203B41FA5}">
                       <a16:colId xmlns:a16="http://schemas.microsoft.com/office/drawing/2014/main" val="3655027934"/>
                     </a:ext>
                   </a:extLst>
                 </a:gridCol>
-                <a:gridCol w="1371983">
+                <a:gridCol w="1333407">
                   <a:extLst>
                     <a:ext uri="{9D8B030D-6E8A-4147-A177-3AD203B41FA5}">
                       <a16:colId xmlns:a16="http://schemas.microsoft.com/office/drawing/2014/main" val="3498593769"/>
@@ -6572,10 +6572,9 @@
                     <a:lstStyle/>
                     <a:p>
                       <a:r>
-                        <a:rPr lang="en-US" sz="1200"/>
-                        <a:t>2040</a:t>
+                        <a:rPr lang="en-US" sz="1200" dirty="0"/>
+                        <a:t>20</a:t>
                       </a:r>
-                      <a:endParaRPr lang="en-US" sz="1200" dirty="0"/>
                     </a:p>
                   </a:txBody>
                   <a:tcPr/>
@@ -6644,7 +6643,7 @@
                     <a:p>
                       <a:r>
                         <a:rPr lang="en-US" sz="1200" dirty="0"/>
-                        <a:t>CART (cp = 0.</a:t>
+                        <a:t>CART (cp = 1.5e-05</a:t>
                       </a:r>
                     </a:p>
                   </a:txBody>
@@ -6655,7 +6654,10 @@
                     <a:bodyPr/>
                     <a:lstStyle/>
                     <a:p>
-                      <a:endParaRPr lang="en-US" sz="1200" dirty="0"/>
+                      <a:r>
+                        <a:rPr lang="en-US" sz="1200" dirty="0"/>
+                        <a:t>0.0410</a:t>
+                      </a:r>
                     </a:p>
                   </a:txBody>
                   <a:tcPr/>
@@ -6665,7 +6667,10 @@
                     <a:bodyPr/>
                     <a:lstStyle/>
                     <a:p>
-                      <a:endParaRPr lang="en-US" sz="1200" dirty="0"/>
+                      <a:r>
+                        <a:rPr lang="en-US" sz="1200" dirty="0"/>
+                        <a:t>26.17</a:t>
+                      </a:r>
                     </a:p>
                   </a:txBody>
                   <a:tcPr/>
@@ -6675,6 +6680,10 @@
                     <a:bodyPr/>
                     <a:lstStyle/>
                     <a:p>
+                      <a:r>
+                        <a:rPr lang="en-US" sz="1200"/>
+                        <a:t>2042</a:t>
+                      </a:r>
                       <a:endParaRPr lang="en-US" sz="1200" dirty="0"/>
                     </a:p>
                   </a:txBody>

</xml_diff>